<commit_message>
New figures and sim scripts
</commit_message>
<xml_diff>
--- a/figures/Practice/InversionSimulation_playPlots.pptx
+++ b/figures/Practice/InversionSimulation_playPlots.pptx
@@ -3460,7 +3460,7 @@
         <p:spPr>
           <a:xfrm>
             <a:off x="0" y="122994"/>
-            <a:ext cx="2262156" cy="6740307"/>
+            <a:ext cx="2262156" cy="7294305"/>
           </a:xfrm>
           <a:prstGeom prst="rect">
             <a:avLst/>
@@ -3484,7 +3484,7 @@
           <a:p>
             <a:r>
               <a:rPr lang="en-US" dirty="0"/>
-              <a:t>Under what levels of selection, migration, and number of loci, etc. underlying the trait of interest does an inversion invade and aid in local adaptation?</a:t>
+              <a:t>Under what levels of selection, migration, and number of loci, etc. underlying the trait of interest does an inversion(s) invade and aid in local adaptation?</a:t>
             </a:r>
           </a:p>
           <a:p>
@@ -3520,7 +3520,7 @@
               <a:rPr lang="en-US" b="0" dirty="0">
                 <a:effectLst/>
               </a:rPr>
-              <a:t>We can do these plots for Average Fitness and Phenotype also.</a:t>
+              <a:t>We can do these plots for Average Fitness and Phenotype also. Check those if interesting.</a:t>
             </a:r>
           </a:p>
           <a:p>
@@ -3727,8 +3727,8 @@
         </p:nvSpPr>
         <p:spPr>
           <a:xfrm>
-            <a:off x="0" y="109139"/>
-            <a:ext cx="2632372" cy="6463308"/>
+            <a:off x="0" y="0"/>
+            <a:ext cx="2632372" cy="7848302"/>
           </a:xfrm>
           <a:prstGeom prst="rect">
             <a:avLst/>
@@ -3804,6 +3804,15 @@
             <a:r>
               <a:rPr lang="en-US" dirty="0"/>
               <a:t> inside it… need to finish reading the paper to understand this problem</a:t>
+            </a:r>
+          </a:p>
+          <a:p>
+            <a:endParaRPr lang="en-US" dirty="0"/>
+          </a:p>
+          <a:p>
+            <a:r>
+              <a:rPr lang="en-US" dirty="0"/>
+              <a:t>Maybe we need to look at the distribution of FST values. Don’t take the mean, plot the histogram </a:t>
             </a:r>
           </a:p>
           <a:p>
@@ -3969,7 +3978,7 @@
         </p:blipFill>
         <p:spPr>
           <a:xfrm>
-            <a:off x="7938655" y="346483"/>
+            <a:off x="7906905" y="3429000"/>
             <a:ext cx="4285095" cy="2906796"/>
           </a:xfrm>
           <a:prstGeom prst="rect">
@@ -4022,7 +4031,7 @@
         <p:spPr>
           <a:xfrm>
             <a:off x="0" y="122994"/>
-            <a:ext cx="2262156" cy="4524315"/>
+            <a:ext cx="2262156" cy="5355312"/>
           </a:xfrm>
           <a:prstGeom prst="rect">
             <a:avLst/>
@@ -4055,6 +4064,17 @@
             <a:r>
               <a:rPr lang="en-US" dirty="0"/>
               <a:t>) neutral, (ii) captured QTNs initially, or (iii) arose neutral and acquired QTNs through mutation?</a:t>
+            </a:r>
+          </a:p>
+          <a:p>
+            <a:endParaRPr lang="en-US" b="0" dirty="0">
+              <a:effectLst/>
+            </a:endParaRPr>
+          </a:p>
+          <a:p>
+            <a:r>
+              <a:rPr lang="en-US" dirty="0"/>
+              <a:t>Side by side and add SD </a:t>
             </a:r>
             <a:endParaRPr lang="en-US" b="0" dirty="0">
               <a:effectLst/>

</xml_diff>